<commit_message>
changed the graph colours
</commit_message>
<xml_diff>
--- a/Presentation/3 Nov/Final Presentation.pptx
+++ b/Presentation/3 Nov/Final Presentation.pptx
@@ -203,7 +203,23 @@
             <c:idx val="0"/>
             <c:spPr>
               <a:solidFill>
-                <a:srgbClr val="FFFF00"/>
+                <a:srgbClr val="7030A0"/>
+              </a:solidFill>
+            </c:spPr>
+          </c:dPt>
+          <c:dPt>
+            <c:idx val="1"/>
+            <c:spPr>
+              <a:solidFill>
+                <a:srgbClr val="0070C0"/>
+              </a:solidFill>
+            </c:spPr>
+          </c:dPt>
+          <c:dPt>
+            <c:idx val="2"/>
+            <c:spPr>
+              <a:solidFill>
+                <a:srgbClr val="00B050"/>
               </a:solidFill>
             </c:spPr>
           </c:dPt>
@@ -277,6 +293,13 @@
     </c:legend>
     <c:plotVisOnly val="1"/>
   </c:chart>
+  <c:spPr>
+    <a:ln>
+      <a:solidFill>
+        <a:prstClr val="black"/>
+      </a:solidFill>
+    </a:ln>
+  </c:spPr>
   <c:externalData r:id="rId1"/>
 </c:chartSpace>
 </file>
@@ -339,6 +362,11 @@
           <c:tx>
             <c:v>Numerical</c:v>
           </c:tx>
+          <c:spPr>
+            <a:solidFill>
+              <a:srgbClr val="7030A0"/>
+            </a:solidFill>
+          </c:spPr>
           <c:cat>
             <c:numRef>
               <c:f>Sheet1!$B$143:$B$145</c:f>
@@ -382,6 +410,11 @@
           <c:tx>
             <c:v>Link name</c:v>
           </c:tx>
+          <c:spPr>
+            <a:solidFill>
+              <a:srgbClr val="00B050"/>
+            </a:solidFill>
+          </c:spPr>
           <c:cat>
             <c:numRef>
               <c:f>Sheet1!$B$143:$B$145</c:f>
@@ -425,6 +458,11 @@
           <c:tx>
             <c:v>Both</c:v>
           </c:tx>
+          <c:spPr>
+            <a:solidFill>
+              <a:srgbClr val="0070C0"/>
+            </a:solidFill>
+          </c:spPr>
           <c:cat>
             <c:numRef>
               <c:f>Sheet1!$B$143:$B$145</c:f>
@@ -463,12 +501,12 @@
           </c:val>
         </c:ser>
         <c:shape val="box"/>
-        <c:axId val="80297344"/>
-        <c:axId val="80299520"/>
+        <c:axId val="81468800"/>
+        <c:axId val="81470976"/>
         <c:axId val="0"/>
       </c:bar3DChart>
       <c:catAx>
-        <c:axId val="80297344"/>
+        <c:axId val="81468800"/>
         <c:scaling>
           <c:orientation val="minMax"/>
         </c:scaling>
@@ -504,14 +542,14 @@
             <a:endParaRPr lang="en-US"/>
           </a:p>
         </c:txPr>
-        <c:crossAx val="80299520"/>
+        <c:crossAx val="81470976"/>
         <c:crosses val="autoZero"/>
         <c:auto val="1"/>
         <c:lblAlgn val="ctr"/>
         <c:lblOffset val="100"/>
       </c:catAx>
       <c:valAx>
-        <c:axId val="80299520"/>
+        <c:axId val="81470976"/>
         <c:scaling>
           <c:orientation val="minMax"/>
         </c:scaling>
@@ -547,7 +585,7 @@
             <a:endParaRPr lang="en-US"/>
           </a:p>
         </c:txPr>
-        <c:crossAx val="80297344"/>
+        <c:crossAx val="81468800"/>
         <c:crosses val="autoZero"/>
         <c:crossBetween val="between"/>
       </c:valAx>
@@ -568,6 +606,13 @@
     </c:legend>
     <c:plotVisOnly val="1"/>
   </c:chart>
+  <c:spPr>
+    <a:ln>
+      <a:solidFill>
+        <a:schemeClr val="tx1"/>
+      </a:solidFill>
+    </a:ln>
+  </c:spPr>
   <c:externalData r:id="rId1"/>
 </c:chartSpace>
 </file>
@@ -618,6 +663,30 @@
           <c:tx>
             <c:v>series 1</c:v>
           </c:tx>
+          <c:dPt>
+            <c:idx val="0"/>
+            <c:spPr>
+              <a:solidFill>
+                <a:srgbClr val="7030A0"/>
+              </a:solidFill>
+            </c:spPr>
+          </c:dPt>
+          <c:dPt>
+            <c:idx val="1"/>
+            <c:spPr>
+              <a:solidFill>
+                <a:srgbClr val="0070C0"/>
+              </a:solidFill>
+            </c:spPr>
+          </c:dPt>
+          <c:dPt>
+            <c:idx val="2"/>
+            <c:spPr>
+              <a:solidFill>
+                <a:srgbClr val="00B050"/>
+              </a:solidFill>
+            </c:spPr>
+          </c:dPt>
           <c:dLbls>
             <c:txPr>
               <a:bodyPr/>
@@ -688,6 +757,13 @@
     </c:legend>
     <c:plotVisOnly val="1"/>
   </c:chart>
+  <c:spPr>
+    <a:ln>
+      <a:solidFill>
+        <a:prstClr val="black"/>
+      </a:solidFill>
+    </a:ln>
+  </c:spPr>
   <c:externalData r:id="rId1"/>
 </c:chartSpace>
 </file>
@@ -729,6 +805,11 @@
           <c:tx>
             <c:v>series 1</c:v>
           </c:tx>
+          <c:spPr>
+            <a:solidFill>
+              <a:srgbClr val="002060"/>
+            </a:solidFill>
+          </c:spPr>
           <c:cat>
             <c:strRef>
               <c:f>Sheet1!$D$9:$D$11</c:f>
@@ -766,12 +847,12 @@
           </c:val>
         </c:ser>
         <c:shape val="box"/>
-        <c:axId val="69511040"/>
-        <c:axId val="69529600"/>
+        <c:axId val="68650880"/>
+        <c:axId val="68665344"/>
         <c:axId val="0"/>
       </c:bar3DChart>
       <c:catAx>
-        <c:axId val="69511040"/>
+        <c:axId val="68650880"/>
         <c:scaling>
           <c:orientation val="minMax"/>
         </c:scaling>
@@ -811,14 +892,14 @@
             <a:endParaRPr lang="en-US"/>
           </a:p>
         </c:txPr>
-        <c:crossAx val="69529600"/>
+        <c:crossAx val="68665344"/>
         <c:crosses val="autoZero"/>
         <c:auto val="1"/>
         <c:lblAlgn val="ctr"/>
         <c:lblOffset val="100"/>
       </c:catAx>
       <c:valAx>
-        <c:axId val="69529600"/>
+        <c:axId val="68665344"/>
         <c:scaling>
           <c:orientation val="minMax"/>
         </c:scaling>
@@ -859,27 +940,20 @@
             <a:endParaRPr lang="en-US"/>
           </a:p>
         </c:txPr>
-        <c:crossAx val="69511040"/>
+        <c:crossAx val="68650880"/>
         <c:crosses val="autoZero"/>
         <c:crossBetween val="between"/>
       </c:valAx>
     </c:plotArea>
-    <c:legend>
-      <c:legendPos val="r"/>
-      <c:layout/>
-      <c:txPr>
-        <a:bodyPr/>
-        <a:lstStyle/>
-        <a:p>
-          <a:pPr>
-            <a:defRPr lang="en-GB"/>
-          </a:pPr>
-          <a:endParaRPr lang="en-US"/>
-        </a:p>
-      </c:txPr>
-    </c:legend>
     <c:plotVisOnly val="1"/>
   </c:chart>
+  <c:spPr>
+    <a:ln>
+      <a:solidFill>
+        <a:prstClr val="black"/>
+      </a:solidFill>
+    </a:ln>
+  </c:spPr>
   <c:externalData r:id="rId1"/>
 </c:chartSpace>
 </file>
@@ -921,6 +995,30 @@
           <c:tx>
             <c:v>series 1</c:v>
           </c:tx>
+          <c:dPt>
+            <c:idx val="0"/>
+            <c:spPr>
+              <a:solidFill>
+                <a:srgbClr val="7030A0"/>
+              </a:solidFill>
+            </c:spPr>
+          </c:dPt>
+          <c:dPt>
+            <c:idx val="1"/>
+            <c:spPr>
+              <a:solidFill>
+                <a:srgbClr val="0070C0"/>
+              </a:solidFill>
+            </c:spPr>
+          </c:dPt>
+          <c:dPt>
+            <c:idx val="2"/>
+            <c:spPr>
+              <a:solidFill>
+                <a:srgbClr val="00B050"/>
+              </a:solidFill>
+            </c:spPr>
+          </c:dPt>
           <c:dLbls>
             <c:txPr>
               <a:bodyPr/>
@@ -991,6 +1089,13 @@
     </c:legend>
     <c:plotVisOnly val="1"/>
   </c:chart>
+  <c:spPr>
+    <a:ln>
+      <a:solidFill>
+        <a:prstClr val="black"/>
+      </a:solidFill>
+    </a:ln>
+  </c:spPr>
   <c:externalData r:id="rId1"/>
 </c:chartSpace>
 </file>
@@ -1032,6 +1137,22 @@
           <c:tx>
             <c:v>series 1</c:v>
           </c:tx>
+          <c:dPt>
+            <c:idx val="1"/>
+            <c:spPr>
+              <a:solidFill>
+                <a:srgbClr val="0070C0"/>
+              </a:solidFill>
+            </c:spPr>
+          </c:dPt>
+          <c:dPt>
+            <c:idx val="2"/>
+            <c:spPr>
+              <a:solidFill>
+                <a:srgbClr val="00B050"/>
+              </a:solidFill>
+            </c:spPr>
+          </c:dPt>
           <c:dLbls>
             <c:txPr>
               <a:bodyPr/>
@@ -1102,6 +1223,13 @@
     </c:legend>
     <c:plotVisOnly val="1"/>
   </c:chart>
+  <c:spPr>
+    <a:ln>
+      <a:solidFill>
+        <a:prstClr val="black"/>
+      </a:solidFill>
+    </a:ln>
+  </c:spPr>
   <c:externalData r:id="rId1"/>
 </c:chartSpace>
 </file>
@@ -1143,6 +1271,11 @@
           <c:tx>
             <c:v>series 1</c:v>
           </c:tx>
+          <c:spPr>
+            <a:solidFill>
+              <a:srgbClr val="002060"/>
+            </a:solidFill>
+          </c:spPr>
           <c:cat>
             <c:strRef>
               <c:f>Sheet1!$D$115:$D$117</c:f>
@@ -1180,12 +1313,12 @@
           </c:val>
         </c:ser>
         <c:shape val="box"/>
-        <c:axId val="72607616"/>
-        <c:axId val="72744960"/>
+        <c:axId val="77846400"/>
+        <c:axId val="79036416"/>
         <c:axId val="0"/>
       </c:bar3DChart>
       <c:catAx>
-        <c:axId val="72607616"/>
+        <c:axId val="77846400"/>
         <c:scaling>
           <c:orientation val="minMax"/>
         </c:scaling>
@@ -1220,14 +1353,14 @@
             <a:endParaRPr lang="en-US"/>
           </a:p>
         </c:txPr>
-        <c:crossAx val="72744960"/>
+        <c:crossAx val="79036416"/>
         <c:crosses val="autoZero"/>
         <c:auto val="1"/>
         <c:lblAlgn val="ctr"/>
         <c:lblOffset val="100"/>
       </c:catAx>
       <c:valAx>
-        <c:axId val="72744960"/>
+        <c:axId val="79036416"/>
         <c:scaling>
           <c:orientation val="minMax"/>
         </c:scaling>
@@ -1268,27 +1401,20 @@
             <a:endParaRPr lang="en-US"/>
           </a:p>
         </c:txPr>
-        <c:crossAx val="72607616"/>
+        <c:crossAx val="77846400"/>
         <c:crosses val="autoZero"/>
         <c:crossBetween val="between"/>
       </c:valAx>
     </c:plotArea>
-    <c:legend>
-      <c:legendPos val="r"/>
-      <c:layout/>
-      <c:txPr>
-        <a:bodyPr/>
-        <a:lstStyle/>
-        <a:p>
-          <a:pPr>
-            <a:defRPr lang="en-GB"/>
-          </a:pPr>
-          <a:endParaRPr lang="en-US"/>
-        </a:p>
-      </c:txPr>
-    </c:legend>
     <c:plotVisOnly val="1"/>
   </c:chart>
+  <c:spPr>
+    <a:ln>
+      <a:solidFill>
+        <a:prstClr val="black"/>
+      </a:solidFill>
+    </a:ln>
+  </c:spPr>
   <c:externalData r:id="rId1"/>
 </c:chartSpace>
 </file>
@@ -1335,6 +1461,11 @@
           <c:tx>
             <c:v>Male</c:v>
           </c:tx>
+          <c:spPr>
+            <a:solidFill>
+              <a:srgbClr val="7030A0"/>
+            </a:solidFill>
+          </c:spPr>
           <c:val>
             <c:numRef>
               <c:f>Sheet1!$B$228:$B$230</c:f>
@@ -1360,6 +1491,11 @@
           <c:tx>
             <c:v>Female</c:v>
           </c:tx>
+          <c:spPr>
+            <a:solidFill>
+              <a:srgbClr val="0070C0"/>
+            </a:solidFill>
+          </c:spPr>
           <c:val>
             <c:numRef>
               <c:f>Sheet1!$C$228:$C$230</c:f>
@@ -1380,12 +1516,12 @@
           </c:val>
         </c:ser>
         <c:shape val="box"/>
-        <c:axId val="72681344"/>
-        <c:axId val="72691712"/>
+        <c:axId val="79095680"/>
+        <c:axId val="66859008"/>
         <c:axId val="0"/>
       </c:bar3DChart>
       <c:catAx>
-        <c:axId val="72681344"/>
+        <c:axId val="79095680"/>
         <c:scaling>
           <c:orientation val="minMax"/>
         </c:scaling>
@@ -1421,14 +1557,14 @@
             <a:endParaRPr lang="en-US"/>
           </a:p>
         </c:txPr>
-        <c:crossAx val="72691712"/>
+        <c:crossAx val="66859008"/>
         <c:crosses val="autoZero"/>
         <c:auto val="1"/>
         <c:lblAlgn val="ctr"/>
         <c:lblOffset val="100"/>
       </c:catAx>
       <c:valAx>
-        <c:axId val="72691712"/>
+        <c:axId val="66859008"/>
         <c:scaling>
           <c:orientation val="minMax"/>
         </c:scaling>
@@ -1464,7 +1600,7 @@
             <a:endParaRPr lang="en-US"/>
           </a:p>
         </c:txPr>
-        <c:crossAx val="72681344"/>
+        <c:crossAx val="79095680"/>
         <c:crosses val="autoZero"/>
         <c:crossBetween val="between"/>
       </c:valAx>
@@ -1485,6 +1621,13 @@
     </c:legend>
     <c:plotVisOnly val="1"/>
   </c:chart>
+  <c:spPr>
+    <a:ln>
+      <a:solidFill>
+        <a:prstClr val="black"/>
+      </a:solidFill>
+    </a:ln>
+  </c:spPr>
   <c:externalData r:id="rId1"/>
 </c:chartSpace>
 </file>
@@ -1539,6 +1682,11 @@
               </c:strCache>
             </c:strRef>
           </c:tx>
+          <c:spPr>
+            <a:solidFill>
+              <a:srgbClr val="7030A0"/>
+            </a:solidFill>
+          </c:spPr>
           <c:cat>
             <c:numRef>
               <c:f>Sheet1!$A$191:$A$193</c:f>
@@ -1590,6 +1738,11 @@
               </c:strCache>
             </c:strRef>
           </c:tx>
+          <c:spPr>
+            <a:solidFill>
+              <a:srgbClr val="00B050"/>
+            </a:solidFill>
+          </c:spPr>
           <c:cat>
             <c:numRef>
               <c:f>Sheet1!$A$191:$A$193</c:f>
@@ -1641,6 +1794,11 @@
               </c:strCache>
             </c:strRef>
           </c:tx>
+          <c:spPr>
+            <a:solidFill>
+              <a:srgbClr val="0070C0"/>
+            </a:solidFill>
+          </c:spPr>
           <c:cat>
             <c:numRef>
               <c:f>Sheet1!$A$191:$A$193</c:f>
@@ -1679,12 +1837,12 @@
           </c:val>
         </c:ser>
         <c:shape val="box"/>
-        <c:axId val="72813184"/>
-        <c:axId val="72819456"/>
+        <c:axId val="66910848"/>
+        <c:axId val="79106816"/>
         <c:axId val="0"/>
       </c:bar3DChart>
       <c:catAx>
-        <c:axId val="72813184"/>
+        <c:axId val="66910848"/>
         <c:scaling>
           <c:orientation val="minMax"/>
         </c:scaling>
@@ -1720,14 +1878,14 @@
             <a:endParaRPr lang="en-US"/>
           </a:p>
         </c:txPr>
-        <c:crossAx val="72819456"/>
+        <c:crossAx val="79106816"/>
         <c:crosses val="autoZero"/>
         <c:auto val="1"/>
         <c:lblAlgn val="ctr"/>
         <c:lblOffset val="100"/>
       </c:catAx>
       <c:valAx>
-        <c:axId val="72819456"/>
+        <c:axId val="79106816"/>
         <c:scaling>
           <c:orientation val="minMax"/>
         </c:scaling>
@@ -1763,7 +1921,7 @@
             <a:endParaRPr lang="en-US"/>
           </a:p>
         </c:txPr>
-        <c:crossAx val="72813184"/>
+        <c:crossAx val="66910848"/>
         <c:crosses val="autoZero"/>
         <c:crossBetween val="between"/>
       </c:valAx>
@@ -1784,6 +1942,13 @@
     </c:legend>
     <c:plotVisOnly val="1"/>
   </c:chart>
+  <c:spPr>
+    <a:ln>
+      <a:solidFill>
+        <a:prstClr val="black"/>
+      </a:solidFill>
+    </a:ln>
+  </c:spPr>
   <c:externalData r:id="rId1"/>
 </c:chartSpace>
 </file>
@@ -1830,6 +1995,30 @@
           <c:tx>
             <c:v>Numerical</c:v>
           </c:tx>
+          <c:dPt>
+            <c:idx val="0"/>
+            <c:spPr>
+              <a:solidFill>
+                <a:srgbClr val="7030A0"/>
+              </a:solidFill>
+            </c:spPr>
+          </c:dPt>
+          <c:dPt>
+            <c:idx val="1"/>
+            <c:spPr>
+              <a:solidFill>
+                <a:srgbClr val="7030A0"/>
+              </a:solidFill>
+            </c:spPr>
+          </c:dPt>
+          <c:dPt>
+            <c:idx val="2"/>
+            <c:spPr>
+              <a:solidFill>
+                <a:srgbClr val="7030A0"/>
+              </a:solidFill>
+            </c:spPr>
+          </c:dPt>
           <c:val>
             <c:numRef>
               <c:f>Sheet1!$C$108:$C$110</c:f>
@@ -1855,6 +2044,11 @@
           <c:tx>
             <c:v>Link name</c:v>
           </c:tx>
+          <c:spPr>
+            <a:solidFill>
+              <a:srgbClr val="0070C0"/>
+            </a:solidFill>
+          </c:spPr>
           <c:val>
             <c:numRef>
               <c:f>Sheet1!$D$108:$D$110</c:f>
@@ -1875,12 +2069,12 @@
           </c:val>
         </c:ser>
         <c:shape val="box"/>
-        <c:axId val="72874624"/>
-        <c:axId val="80024320"/>
+        <c:axId val="79161984"/>
+        <c:axId val="81265408"/>
         <c:axId val="0"/>
       </c:bar3DChart>
       <c:catAx>
-        <c:axId val="72874624"/>
+        <c:axId val="79161984"/>
         <c:scaling>
           <c:orientation val="minMax"/>
         </c:scaling>
@@ -1915,14 +2109,14 @@
             <a:endParaRPr lang="en-US"/>
           </a:p>
         </c:txPr>
-        <c:crossAx val="80024320"/>
+        <c:crossAx val="81265408"/>
         <c:crosses val="autoZero"/>
         <c:auto val="1"/>
         <c:lblAlgn val="ctr"/>
         <c:lblOffset val="100"/>
       </c:catAx>
       <c:valAx>
-        <c:axId val="80024320"/>
+        <c:axId val="81265408"/>
         <c:scaling>
           <c:orientation val="minMax"/>
         </c:scaling>
@@ -1958,7 +2152,7 @@
             <a:endParaRPr lang="en-US"/>
           </a:p>
         </c:txPr>
-        <c:crossAx val="72874624"/>
+        <c:crossAx val="79161984"/>
         <c:crosses val="autoZero"/>
         <c:crossBetween val="between"/>
       </c:valAx>
@@ -1979,6 +2173,13 @@
     </c:legend>
     <c:plotVisOnly val="1"/>
   </c:chart>
+  <c:spPr>
+    <a:ln>
+      <a:solidFill>
+        <a:prstClr val="black"/>
+      </a:solidFill>
+    </a:ln>
+  </c:spPr>
   <c:externalData r:id="rId1"/>
 </c:chartSpace>
 </file>
@@ -16015,8 +16216,43 @@
                 <a:latin typeface="Arial" pitchFamily="34" charset="0"/>
                 <a:cs typeface="Arial" pitchFamily="34" charset="0"/>
               </a:rPr>
-              <a:t>No feedback sections</a:t>
-            </a:r>
+              <a:t>Similar to iteration 1.</a:t>
+            </a:r>
+          </a:p>
+          <a:p>
+            <a:pPr marL="1115568" lvl="2" indent="-246888">
+              <a:spcBef>
+                <a:spcPts val="300"/>
+              </a:spcBef>
+              <a:buFont typeface="Arial" pitchFamily="34" charset="0"/>
+              <a:buChar char="•"/>
+              <a:defRPr/>
+            </a:pPr>
+            <a:r>
+              <a:rPr lang="en-US" sz="3200" dirty="0" smtClean="0">
+                <a:latin typeface="Arial" pitchFamily="34" charset="0"/>
+                <a:cs typeface="Arial" pitchFamily="34" charset="0"/>
+              </a:rPr>
+              <a:t>No </a:t>
+            </a:r>
+            <a:r>
+              <a:rPr lang="en-US" sz="3200" dirty="0" smtClean="0">
+                <a:latin typeface="Arial" pitchFamily="34" charset="0"/>
+                <a:cs typeface="Arial" pitchFamily="34" charset="0"/>
+              </a:rPr>
+              <a:t>feedback </a:t>
+            </a:r>
+            <a:r>
+              <a:rPr lang="en-US" sz="3200" dirty="0" smtClean="0">
+                <a:latin typeface="Arial" pitchFamily="34" charset="0"/>
+                <a:cs typeface="Arial" pitchFamily="34" charset="0"/>
+              </a:rPr>
+              <a:t>sections.</a:t>
+            </a:r>
+            <a:endParaRPr lang="en-US" sz="3200" dirty="0" smtClean="0">
+              <a:latin typeface="Arial" pitchFamily="34" charset="0"/>
+              <a:cs typeface="Arial" pitchFamily="34" charset="0"/>
+            </a:endParaRPr>
           </a:p>
         </p:txBody>
       </p:sp>
@@ -17735,19 +17971,8 @@
                 <a:latin typeface="Arial" pitchFamily="34" charset="0"/>
                 <a:cs typeface="Arial" pitchFamily="34" charset="0"/>
               </a:rPr>
-              <a:t>Numerical referencing: </a:t>
-            </a:r>
-            <a:r>
-              <a:rPr lang="en-US" sz="3500" dirty="0" smtClean="0">
-                <a:latin typeface="Arial" pitchFamily="34" charset="0"/>
-                <a:cs typeface="Arial" pitchFamily="34" charset="0"/>
-              </a:rPr>
-              <a:t>70%. </a:t>
-            </a:r>
-            <a:endParaRPr lang="en-US" sz="3500" dirty="0" smtClean="0">
-              <a:latin typeface="Arial" pitchFamily="34" charset="0"/>
-              <a:cs typeface="Arial" pitchFamily="34" charset="0"/>
-            </a:endParaRPr>
+              <a:t>Numerical referencing: 70%. </a:t>
+            </a:r>
           </a:p>
           <a:p>
             <a:pPr marL="1115568" lvl="2" indent="-246888">
@@ -17769,7 +17994,7 @@
                 <a:latin typeface="Arial" pitchFamily="34" charset="0"/>
                 <a:cs typeface="Arial" pitchFamily="34" charset="0"/>
               </a:rPr>
-              <a:t>29%.</a:t>
+              <a:t>30%.</a:t>
             </a:r>
             <a:endParaRPr lang="en-US" sz="3200" dirty="0" smtClean="0">
               <a:latin typeface="Arial" pitchFamily="34" charset="0"/>
@@ -17818,8 +18043,8 @@
           <p:nvPr/>
         </p:nvGraphicFramePr>
         <p:xfrm>
-          <a:off x="4182256" y="3641860"/>
-          <a:ext cx="4422098" cy="2840636"/>
+          <a:off x="4282440" y="3672840"/>
+          <a:ext cx="4321914" cy="2809656"/>
         </p:xfrm>
         <a:graphic>
           <a:graphicData uri="http://schemas.openxmlformats.org/drawingml/2006/chart">
@@ -17835,7 +18060,7 @@
         </p:nvSpPr>
         <p:spPr>
           <a:xfrm>
-            <a:off x="624840" y="3398520"/>
+            <a:off x="533400" y="3200400"/>
             <a:ext cx="5410200" cy="907941"/>
           </a:xfrm>
           <a:prstGeom prst="rect">
@@ -18112,8 +18337,8 @@
           <p:nvPr/>
         </p:nvGraphicFramePr>
         <p:xfrm>
-          <a:off x="3395270" y="1200212"/>
-          <a:ext cx="4654447" cy="2881860"/>
+          <a:off x="4114800" y="1203960"/>
+          <a:ext cx="4117797" cy="2695232"/>
         </p:xfrm>
         <a:graphic>
           <a:graphicData uri="http://schemas.openxmlformats.org/drawingml/2006/chart">
@@ -18128,8 +18353,8 @@
           <p:nvPr/>
         </p:nvGraphicFramePr>
         <p:xfrm>
-          <a:off x="3392774" y="3931920"/>
-          <a:ext cx="4572000" cy="2743200"/>
+          <a:off x="3368040" y="4069080"/>
+          <a:ext cx="4200494" cy="2606040"/>
         </p:xfrm>
         <a:graphic>
           <a:graphicData uri="http://schemas.openxmlformats.org/drawingml/2006/chart">
@@ -18473,19 +18698,8 @@
                 <a:latin typeface="Arial" pitchFamily="34" charset="0"/>
                 <a:cs typeface="Arial" pitchFamily="34" charset="0"/>
               </a:rPr>
-              <a:t>Numerical referencing: </a:t>
-            </a:r>
-            <a:r>
-              <a:rPr lang="en-US" sz="3500" dirty="0" smtClean="0">
-                <a:latin typeface="Arial" pitchFamily="34" charset="0"/>
-                <a:cs typeface="Arial" pitchFamily="34" charset="0"/>
-              </a:rPr>
-              <a:t>68%. </a:t>
-            </a:r>
-            <a:endParaRPr lang="en-US" sz="3500" dirty="0" smtClean="0">
-              <a:latin typeface="Arial" pitchFamily="34" charset="0"/>
-              <a:cs typeface="Arial" pitchFamily="34" charset="0"/>
-            </a:endParaRPr>
+              <a:t>Numerical referencing: 68%. </a:t>
+            </a:r>
           </a:p>
           <a:p>
             <a:pPr marL="1115568" lvl="2" indent="-246888">
@@ -18507,7 +18721,7 @@
                 <a:latin typeface="Arial" pitchFamily="34" charset="0"/>
                 <a:cs typeface="Arial" pitchFamily="34" charset="0"/>
               </a:rPr>
-              <a:t>31%.</a:t>
+              <a:t>32%.</a:t>
             </a:r>
             <a:endParaRPr lang="en-US" sz="3200" dirty="0" smtClean="0">
               <a:latin typeface="Arial" pitchFamily="34" charset="0"/>
@@ -18556,8 +18770,8 @@
           <p:nvPr/>
         </p:nvGraphicFramePr>
         <p:xfrm>
-          <a:off x="4069580" y="3646857"/>
-          <a:ext cx="4572000" cy="2743200"/>
+          <a:off x="4556760" y="3916680"/>
+          <a:ext cx="4084820" cy="2473376"/>
         </p:xfrm>
         <a:graphic>
           <a:graphicData uri="http://schemas.openxmlformats.org/drawingml/2006/chart">
@@ -18897,8 +19111,8 @@
           <p:nvPr/>
         </p:nvGraphicFramePr>
         <p:xfrm>
-          <a:off x="4369631" y="1011837"/>
-          <a:ext cx="4572000" cy="2743200"/>
+          <a:off x="4678679" y="1173479"/>
+          <a:ext cx="4262951" cy="2581557"/>
         </p:xfrm>
         <a:graphic>
           <a:graphicData uri="http://schemas.openxmlformats.org/drawingml/2006/chart">
@@ -18962,8 +19176,8 @@
           <p:nvPr/>
         </p:nvGraphicFramePr>
         <p:xfrm>
-          <a:off x="4279691" y="3904938"/>
-          <a:ext cx="4572000" cy="2743200"/>
+          <a:off x="4998720" y="4160520"/>
+          <a:ext cx="3852970" cy="2487618"/>
         </p:xfrm>
         <a:graphic>
           <a:graphicData uri="http://schemas.openxmlformats.org/drawingml/2006/chart">
@@ -19240,19 +19454,8 @@
                 <a:latin typeface="Arial" pitchFamily="34" charset="0"/>
                 <a:cs typeface="Arial" pitchFamily="34" charset="0"/>
               </a:rPr>
-              <a:t>Link name referencing: </a:t>
-            </a:r>
-            <a:r>
-              <a:rPr lang="en-US" sz="3200" dirty="0" smtClean="0">
-                <a:latin typeface="Arial" pitchFamily="34" charset="0"/>
-                <a:cs typeface="Arial" pitchFamily="34" charset="0"/>
-              </a:rPr>
-              <a:t>54%.</a:t>
-            </a:r>
-            <a:endParaRPr lang="en-US" sz="3200" dirty="0" smtClean="0">
-              <a:latin typeface="Arial" pitchFamily="34" charset="0"/>
-              <a:cs typeface="Arial" pitchFamily="34" charset="0"/>
-            </a:endParaRPr>
+              <a:t>Link name referencing: 54%.</a:t>
+            </a:r>
           </a:p>
           <a:p>
             <a:pPr marL="1115568" lvl="2" indent="-246888">
@@ -19274,7 +19477,7 @@
                 <a:latin typeface="Arial" pitchFamily="34" charset="0"/>
                 <a:cs typeface="Arial" pitchFamily="34" charset="0"/>
               </a:rPr>
-              <a:t>45%.</a:t>
+              <a:t>46%.</a:t>
             </a:r>
             <a:endParaRPr lang="en-US" sz="3200" dirty="0" smtClean="0">
               <a:latin typeface="Arial" pitchFamily="34" charset="0"/>
@@ -19677,7 +19880,7 @@
           <p:nvPr/>
         </p:nvGraphicFramePr>
         <p:xfrm>
-          <a:off x="2301240" y="2453640"/>
+          <a:off x="1996440" y="2667000"/>
           <a:ext cx="5455920" cy="3596640"/>
         </p:xfrm>
         <a:graphic>
@@ -20964,7 +21167,7 @@
         </p:nvSpPr>
         <p:spPr>
           <a:xfrm>
-            <a:off x="-498184" y="4728119"/>
+            <a:off x="-498184" y="4865279"/>
             <a:ext cx="10523095" cy="1439217"/>
           </a:xfrm>
           <a:prstGeom prst="rect">
@@ -21014,7 +21217,7 @@
           <p:nvPr/>
         </p:nvGraphicFramePr>
         <p:xfrm>
-          <a:off x="1980456" y="2036823"/>
+          <a:off x="2209056" y="2036823"/>
           <a:ext cx="4572000" cy="2743200"/>
         </p:xfrm>
         <a:graphic>

</xml_diff>